<commit_message>
unix ch2 assignment solved & energy quiz 2, 3 solved & physics2 file added
</commit_message>
<xml_diff>
--- a/unix/유닉스 이론 강의자료/CH01_BASIC .pptx
+++ b/unix/유닉스 이론 강의자료/CH01_BASIC .pptx
@@ -292,7 +292,7 @@
             <a:fld id="{CF97196E-9F4A-4746-96C9-7541C3625210}" type="datetimeFigureOut">
               <a:rPr lang="ko-KR" altLang="en-US"/>
               <a:pPr/>
-              <a:t>2018-09-03</a:t>
+              <a:t>2019-10-12</a:t>
             </a:fld>
             <a:endParaRPr lang="en-US" altLang="ko-KR"/>
           </a:p>
@@ -4123,7 +4123,7 @@
           <a:graphicData uri="http://schemas.openxmlformats.org/presentationml/2006/ole">
             <mc:AlternateContent xmlns:mc="http://schemas.openxmlformats.org/markup-compatibility/2006">
               <mc:Choice xmlns:v="urn:schemas-microsoft-com:vml" Requires="v">
-                <p:oleObj spid="_x0000_s62487" name="VISIO" r:id="rId3" imgW="6890400" imgH="1689840" progId="">
+                <p:oleObj spid="_x0000_s62488" name="VISIO" r:id="rId3" imgW="6890400" imgH="1689840" progId="">
                   <p:embed/>
                 </p:oleObj>
               </mc:Choice>
@@ -5585,7 +5585,7 @@
           <a:graphicData uri="http://schemas.openxmlformats.org/presentationml/2006/ole">
             <mc:AlternateContent xmlns:mc="http://schemas.openxmlformats.org/markup-compatibility/2006">
               <mc:Choice xmlns:v="urn:schemas-microsoft-com:vml" Requires="v">
-                <p:oleObj spid="_x0000_s45079" name="Visio" r:id="rId3" imgW="5560827" imgH="1144034" progId="">
+                <p:oleObj spid="_x0000_s45080" name="Visio" r:id="rId3" imgW="5560827" imgH="1144034" progId="">
                   <p:embed/>
                 </p:oleObj>
               </mc:Choice>

</xml_diff>